<commit_message>
add fritzing files to git project
</commit_message>
<xml_diff>
--- a/state diagram/state diagram.pptx
+++ b/state diagram/state diagram.pptx
@@ -288,7 +288,7 @@
           <a:p>
             <a:fld id="{60C49D9A-7CB1-C04A-AC0C-A58ED6179FBA}" type="datetimeFigureOut">
               <a:rPr lang="en-US" smtClean="0"/>
-              <a:t>4/20/14</a:t>
+              <a:t>4/21/14</a:t>
             </a:fld>
             <a:endParaRPr lang="en-US"/>
           </a:p>
@@ -458,7 +458,7 @@
           <a:p>
             <a:fld id="{60C49D9A-7CB1-C04A-AC0C-A58ED6179FBA}" type="datetimeFigureOut">
               <a:rPr lang="en-US" smtClean="0"/>
-              <a:t>4/20/14</a:t>
+              <a:t>4/21/14</a:t>
             </a:fld>
             <a:endParaRPr lang="en-US"/>
           </a:p>
@@ -638,7 +638,7 @@
           <a:p>
             <a:fld id="{60C49D9A-7CB1-C04A-AC0C-A58ED6179FBA}" type="datetimeFigureOut">
               <a:rPr lang="en-US" smtClean="0"/>
-              <a:t>4/20/14</a:t>
+              <a:t>4/21/14</a:t>
             </a:fld>
             <a:endParaRPr lang="en-US"/>
           </a:p>
@@ -808,7 +808,7 @@
           <a:p>
             <a:fld id="{60C49D9A-7CB1-C04A-AC0C-A58ED6179FBA}" type="datetimeFigureOut">
               <a:rPr lang="en-US" smtClean="0"/>
-              <a:t>4/20/14</a:t>
+              <a:t>4/21/14</a:t>
             </a:fld>
             <a:endParaRPr lang="en-US"/>
           </a:p>
@@ -1054,7 +1054,7 @@
           <a:p>
             <a:fld id="{60C49D9A-7CB1-C04A-AC0C-A58ED6179FBA}" type="datetimeFigureOut">
               <a:rPr lang="en-US" smtClean="0"/>
-              <a:t>4/20/14</a:t>
+              <a:t>4/21/14</a:t>
             </a:fld>
             <a:endParaRPr lang="en-US"/>
           </a:p>
@@ -1342,7 +1342,7 @@
           <a:p>
             <a:fld id="{60C49D9A-7CB1-C04A-AC0C-A58ED6179FBA}" type="datetimeFigureOut">
               <a:rPr lang="en-US" smtClean="0"/>
-              <a:t>4/20/14</a:t>
+              <a:t>4/21/14</a:t>
             </a:fld>
             <a:endParaRPr lang="en-US"/>
           </a:p>
@@ -1769,7 +1769,7 @@
           <a:p>
             <a:fld id="{60C49D9A-7CB1-C04A-AC0C-A58ED6179FBA}" type="datetimeFigureOut">
               <a:rPr lang="en-US" smtClean="0"/>
-              <a:t>4/20/14</a:t>
+              <a:t>4/21/14</a:t>
             </a:fld>
             <a:endParaRPr lang="en-US"/>
           </a:p>
@@ -1887,7 +1887,7 @@
           <a:p>
             <a:fld id="{60C49D9A-7CB1-C04A-AC0C-A58ED6179FBA}" type="datetimeFigureOut">
               <a:rPr lang="en-US" smtClean="0"/>
-              <a:t>4/20/14</a:t>
+              <a:t>4/21/14</a:t>
             </a:fld>
             <a:endParaRPr lang="en-US"/>
           </a:p>
@@ -1982,7 +1982,7 @@
           <a:p>
             <a:fld id="{60C49D9A-7CB1-C04A-AC0C-A58ED6179FBA}" type="datetimeFigureOut">
               <a:rPr lang="en-US" smtClean="0"/>
-              <a:t>4/20/14</a:t>
+              <a:t>4/21/14</a:t>
             </a:fld>
             <a:endParaRPr lang="en-US"/>
           </a:p>
@@ -2259,7 +2259,7 @@
           <a:p>
             <a:fld id="{60C49D9A-7CB1-C04A-AC0C-A58ED6179FBA}" type="datetimeFigureOut">
               <a:rPr lang="en-US" smtClean="0"/>
-              <a:t>4/20/14</a:t>
+              <a:t>4/21/14</a:t>
             </a:fld>
             <a:endParaRPr lang="en-US"/>
           </a:p>
@@ -2512,7 +2512,7 @@
           <a:p>
             <a:fld id="{60C49D9A-7CB1-C04A-AC0C-A58ED6179FBA}" type="datetimeFigureOut">
               <a:rPr lang="en-US" smtClean="0"/>
-              <a:t>4/20/14</a:t>
+              <a:t>4/21/14</a:t>
             </a:fld>
             <a:endParaRPr lang="en-US"/>
           </a:p>
@@ -2725,7 +2725,7 @@
           <a:p>
             <a:fld id="{60C49D9A-7CB1-C04A-AC0C-A58ED6179FBA}" type="datetimeFigureOut">
               <a:rPr lang="en-US" smtClean="0"/>
-              <a:t>4/20/14</a:t>
+              <a:t>4/21/14</a:t>
             </a:fld>
             <a:endParaRPr lang="en-US"/>
           </a:p>
@@ -3196,11 +3196,6 @@
               </a:rPr>
               <a:t>9</a:t>
             </a:r>
-            <a:endParaRPr lang="en-US" sz="1800" dirty="0" smtClean="0">
-              <a:solidFill>
-                <a:schemeClr val="tx1"/>
-              </a:solidFill>
-            </a:endParaRPr>
           </a:p>
         </p:txBody>
       </p:sp>
@@ -3479,11 +3474,6 @@
               </a:rPr>
               <a:t>1</a:t>
             </a:r>
-            <a:endParaRPr lang="en-US" sz="1800" dirty="0" smtClean="0">
-              <a:solidFill>
-                <a:schemeClr val="tx1"/>
-              </a:solidFill>
-            </a:endParaRPr>
           </a:p>
         </p:txBody>
       </p:sp>
@@ -3531,11 +3521,6 @@
               </a:rPr>
               <a:t>2</a:t>
             </a:r>
-            <a:endParaRPr lang="en-US" sz="1800" dirty="0" smtClean="0">
-              <a:solidFill>
-                <a:schemeClr val="tx1"/>
-              </a:solidFill>
-            </a:endParaRPr>
           </a:p>
         </p:txBody>
       </p:sp>
@@ -3778,11 +3763,6 @@
               </a:rPr>
               <a:t>6</a:t>
             </a:r>
-            <a:endParaRPr lang="en-US" sz="1800" dirty="0" smtClean="0">
-              <a:solidFill>
-                <a:schemeClr val="tx1"/>
-              </a:solidFill>
-            </a:endParaRPr>
           </a:p>
         </p:txBody>
       </p:sp>
@@ -3830,11 +3810,6 @@
               </a:rPr>
               <a:t>7</a:t>
             </a:r>
-            <a:endParaRPr lang="en-US" sz="1800" dirty="0" smtClean="0">
-              <a:solidFill>
-                <a:schemeClr val="tx1"/>
-              </a:solidFill>
-            </a:endParaRPr>
           </a:p>
         </p:txBody>
       </p:sp>
@@ -4609,11 +4584,6 @@
               </a:rPr>
               <a:t>8</a:t>
             </a:r>
-            <a:endParaRPr lang="en-US" sz="1800" dirty="0" smtClean="0">
-              <a:solidFill>
-                <a:schemeClr val="tx1"/>
-              </a:solidFill>
-            </a:endParaRPr>
           </a:p>
         </p:txBody>
       </p:sp>
@@ -4661,11 +4631,6 @@
               </a:rPr>
               <a:t>13</a:t>
             </a:r>
-            <a:endParaRPr lang="en-US" sz="1800" dirty="0" smtClean="0">
-              <a:solidFill>
-                <a:schemeClr val="tx1"/>
-              </a:solidFill>
-            </a:endParaRPr>
           </a:p>
         </p:txBody>
       </p:sp>
@@ -4760,11 +4725,6 @@
               </a:rPr>
               <a:t>10</a:t>
             </a:r>
-            <a:endParaRPr lang="en-US" sz="1800" dirty="0" smtClean="0">
-              <a:solidFill>
-                <a:schemeClr val="tx1"/>
-              </a:solidFill>
-            </a:endParaRPr>
           </a:p>
         </p:txBody>
       </p:sp>
@@ -4812,11 +4772,6 @@
               </a:rPr>
               <a:t>14</a:t>
             </a:r>
-            <a:endParaRPr lang="en-US" sz="1800" dirty="0" smtClean="0">
-              <a:solidFill>
-                <a:schemeClr val="tx1"/>
-              </a:solidFill>
-            </a:endParaRPr>
           </a:p>
         </p:txBody>
       </p:sp>
@@ -4864,11 +4819,6 @@
               </a:rPr>
               <a:t>16</a:t>
             </a:r>
-            <a:endParaRPr lang="en-US" sz="1800" dirty="0" smtClean="0">
-              <a:solidFill>
-                <a:schemeClr val="tx1"/>
-              </a:solidFill>
-            </a:endParaRPr>
           </a:p>
         </p:txBody>
       </p:sp>
@@ -4963,11 +4913,6 @@
               </a:rPr>
               <a:t>24</a:t>
             </a:r>
-            <a:endParaRPr lang="en-US" sz="1800" dirty="0" smtClean="0">
-              <a:solidFill>
-                <a:schemeClr val="tx1"/>
-              </a:solidFill>
-            </a:endParaRPr>
           </a:p>
         </p:txBody>
       </p:sp>
@@ -5747,11 +5692,6 @@
               </a:rPr>
               <a:t>11</a:t>
             </a:r>
-            <a:endParaRPr lang="en-US" sz="1800" dirty="0" smtClean="0">
-              <a:solidFill>
-                <a:schemeClr val="tx1"/>
-              </a:solidFill>
-            </a:endParaRPr>
           </a:p>
         </p:txBody>
       </p:sp>
@@ -6226,7 +6166,7 @@
         </p:nvSpPr>
         <p:spPr>
           <a:xfrm>
-            <a:off x="3574844" y="10388600"/>
+            <a:off x="3502097" y="10387396"/>
             <a:ext cx="2610210" cy="338554"/>
           </a:xfrm>
           <a:prstGeom prst="rect">
@@ -6334,7 +6274,7 @@
         </p:nvSpPr>
         <p:spPr>
           <a:xfrm>
-            <a:off x="3608563" y="11257435"/>
+            <a:off x="3434990" y="11233937"/>
             <a:ext cx="2610210" cy="338554"/>
           </a:xfrm>
           <a:prstGeom prst="rect">
@@ -6474,11 +6414,6 @@
               </a:rPr>
               <a:t>17</a:t>
             </a:r>
-            <a:endParaRPr lang="en-US" sz="1800" dirty="0" smtClean="0">
-              <a:solidFill>
-                <a:schemeClr val="tx1"/>
-              </a:solidFill>
-            </a:endParaRPr>
           </a:p>
         </p:txBody>
       </p:sp>
@@ -6526,11 +6461,6 @@
               </a:rPr>
               <a:t>18</a:t>
             </a:r>
-            <a:endParaRPr lang="en-US" sz="1800" dirty="0" smtClean="0">
-              <a:solidFill>
-                <a:schemeClr val="tx1"/>
-              </a:solidFill>
-            </a:endParaRPr>
           </a:p>
         </p:txBody>
       </p:sp>
@@ -6625,11 +6555,6 @@
               </a:rPr>
               <a:t>19</a:t>
             </a:r>
-            <a:endParaRPr lang="en-US" sz="1800" dirty="0" smtClean="0">
-              <a:solidFill>
-                <a:schemeClr val="tx1"/>
-              </a:solidFill>
-            </a:endParaRPr>
           </a:p>
         </p:txBody>
       </p:sp>
@@ -8121,11 +8046,6 @@
               </a:rPr>
               <a:t>28</a:t>
             </a:r>
-            <a:endParaRPr lang="en-US" sz="1800" dirty="0" smtClean="0">
-              <a:solidFill>
-                <a:schemeClr val="tx1"/>
-              </a:solidFill>
-            </a:endParaRPr>
           </a:p>
         </p:txBody>
       </p:sp>

</xml_diff>